<commit_message>
Push from Nicoco =)
</commit_message>
<xml_diff>
--- a/Sécurité.pptx
+++ b/Sécurité.pptx
@@ -15,7 +15,8 @@
     <p:sldId id="258" r:id="rId9"/>
     <p:sldId id="266" r:id="rId10"/>
     <p:sldId id="259" r:id="rId11"/>
-    <p:sldId id="260" r:id="rId12"/>
+    <p:sldId id="267" r:id="rId12"/>
+    <p:sldId id="260" r:id="rId13"/>
   </p:sldIdLst>
   <p:sldSz cx="12192000" cy="6858000"/>
   <p:notesSz cx="6858000" cy="9144000"/>
@@ -114,6 +115,11 @@
       </a:defRPr>
     </a:lvl9pPr>
   </p:defaultTextStyle>
+  <p:extLst>
+    <p:ext uri="{EFAFB233-063F-42B5-8137-9DF3F51BA10A}">
+      <p15:sldGuideLst xmlns:p15="http://schemas.microsoft.com/office/powerpoint/2012/main"/>
+    </p:ext>
+  </p:extLst>
 </p:presentation>
 </file>
 
@@ -266,7 +272,7 @@
           <a:p>
             <a:fld id="{EEC7E1AC-E410-4CD1-B28D-E2E3F92D53F4}" type="datetimeFigureOut">
               <a:rPr lang="fr-CA" smtClean="0"/>
-              <a:t>2023-11-16</a:t>
+              <a:t>2023-11-17</a:t>
             </a:fld>
             <a:endParaRPr lang="fr-CA"/>
           </a:p>
@@ -466,7 +472,7 @@
           <a:p>
             <a:fld id="{EEC7E1AC-E410-4CD1-B28D-E2E3F92D53F4}" type="datetimeFigureOut">
               <a:rPr lang="fr-CA" smtClean="0"/>
-              <a:t>2023-11-16</a:t>
+              <a:t>2023-11-17</a:t>
             </a:fld>
             <a:endParaRPr lang="fr-CA"/>
           </a:p>
@@ -676,7 +682,7 @@
           <a:p>
             <a:fld id="{EEC7E1AC-E410-4CD1-B28D-E2E3F92D53F4}" type="datetimeFigureOut">
               <a:rPr lang="fr-CA" smtClean="0"/>
-              <a:t>2023-11-16</a:t>
+              <a:t>2023-11-17</a:t>
             </a:fld>
             <a:endParaRPr lang="fr-CA"/>
           </a:p>
@@ -876,7 +882,7 @@
           <a:p>
             <a:fld id="{EEC7E1AC-E410-4CD1-B28D-E2E3F92D53F4}" type="datetimeFigureOut">
               <a:rPr lang="fr-CA" smtClean="0"/>
-              <a:t>2023-11-16</a:t>
+              <a:t>2023-11-17</a:t>
             </a:fld>
             <a:endParaRPr lang="fr-CA"/>
           </a:p>
@@ -1152,7 +1158,7 @@
           <a:p>
             <a:fld id="{EEC7E1AC-E410-4CD1-B28D-E2E3F92D53F4}" type="datetimeFigureOut">
               <a:rPr lang="fr-CA" smtClean="0"/>
-              <a:t>2023-11-16</a:t>
+              <a:t>2023-11-17</a:t>
             </a:fld>
             <a:endParaRPr lang="fr-CA"/>
           </a:p>
@@ -1420,7 +1426,7 @@
           <a:p>
             <a:fld id="{EEC7E1AC-E410-4CD1-B28D-E2E3F92D53F4}" type="datetimeFigureOut">
               <a:rPr lang="fr-CA" smtClean="0"/>
-              <a:t>2023-11-16</a:t>
+              <a:t>2023-11-17</a:t>
             </a:fld>
             <a:endParaRPr lang="fr-CA"/>
           </a:p>
@@ -1835,7 +1841,7 @@
           <a:p>
             <a:fld id="{EEC7E1AC-E410-4CD1-B28D-E2E3F92D53F4}" type="datetimeFigureOut">
               <a:rPr lang="fr-CA" smtClean="0"/>
-              <a:t>2023-11-16</a:t>
+              <a:t>2023-11-17</a:t>
             </a:fld>
             <a:endParaRPr lang="fr-CA"/>
           </a:p>
@@ -1977,7 +1983,7 @@
           <a:p>
             <a:fld id="{EEC7E1AC-E410-4CD1-B28D-E2E3F92D53F4}" type="datetimeFigureOut">
               <a:rPr lang="fr-CA" smtClean="0"/>
-              <a:t>2023-11-16</a:t>
+              <a:t>2023-11-17</a:t>
             </a:fld>
             <a:endParaRPr lang="fr-CA"/>
           </a:p>
@@ -2090,7 +2096,7 @@
           <a:p>
             <a:fld id="{EEC7E1AC-E410-4CD1-B28D-E2E3F92D53F4}" type="datetimeFigureOut">
               <a:rPr lang="fr-CA" smtClean="0"/>
-              <a:t>2023-11-16</a:t>
+              <a:t>2023-11-17</a:t>
             </a:fld>
             <a:endParaRPr lang="fr-CA"/>
           </a:p>
@@ -2403,7 +2409,7 @@
           <a:p>
             <a:fld id="{EEC7E1AC-E410-4CD1-B28D-E2E3F92D53F4}" type="datetimeFigureOut">
               <a:rPr lang="fr-CA" smtClean="0"/>
-              <a:t>2023-11-16</a:t>
+              <a:t>2023-11-17</a:t>
             </a:fld>
             <a:endParaRPr lang="fr-CA"/>
           </a:p>
@@ -2692,7 +2698,7 @@
           <a:p>
             <a:fld id="{EEC7E1AC-E410-4CD1-B28D-E2E3F92D53F4}" type="datetimeFigureOut">
               <a:rPr lang="fr-CA" smtClean="0"/>
-              <a:t>2023-11-16</a:t>
+              <a:t>2023-11-17</a:t>
             </a:fld>
             <a:endParaRPr lang="fr-CA"/>
           </a:p>
@@ -2935,7 +2941,7 @@
           <a:p>
             <a:fld id="{EEC7E1AC-E410-4CD1-B28D-E2E3F92D53F4}" type="datetimeFigureOut">
               <a:rPr lang="fr-CA" smtClean="0"/>
-              <a:t>2023-11-16</a:t>
+              <a:t>2023-11-17</a:t>
             </a:fld>
             <a:endParaRPr lang="fr-CA"/>
           </a:p>
@@ -3710,6 +3716,223 @@
           <a:chExt cx="0" cy="0"/>
         </a:xfrm>
       </p:grpSpPr>
+      <p:pic>
+        <p:nvPicPr>
+          <p:cNvPr id="4" name="Image 3">
+            <a:extLst>
+              <a:ext uri="{FF2B5EF4-FFF2-40B4-BE49-F238E27FC236}">
+                <a16:creationId xmlns:a16="http://schemas.microsoft.com/office/drawing/2014/main" id="{A65C9B11-1E59-BE4C-8BAC-EE147CAC9E2C}"/>
+              </a:ext>
+            </a:extLst>
+          </p:cNvPr>
+          <p:cNvPicPr>
+            <a:picLocks noChangeAspect="1"/>
+          </p:cNvPicPr>
+          <p:nvPr/>
+        </p:nvPicPr>
+        <p:blipFill>
+          <a:blip r:embed="rId2"/>
+          <a:stretch>
+            <a:fillRect/>
+          </a:stretch>
+        </p:blipFill>
+        <p:spPr>
+          <a:xfrm>
+            <a:off x="623506" y="2871216"/>
+            <a:ext cx="4839475" cy="2229421"/>
+          </a:xfrm>
+          <a:prstGeom prst="rect">
+            <a:avLst/>
+          </a:prstGeom>
+        </p:spPr>
+      </p:pic>
+      <p:pic>
+        <p:nvPicPr>
+          <p:cNvPr id="5" name="Image 4">
+            <a:extLst>
+              <a:ext uri="{FF2B5EF4-FFF2-40B4-BE49-F238E27FC236}">
+                <a16:creationId xmlns:a16="http://schemas.microsoft.com/office/drawing/2014/main" id="{A0FF7E6F-D3E0-7E27-4904-42401D038EAD}"/>
+              </a:ext>
+            </a:extLst>
+          </p:cNvPr>
+          <p:cNvPicPr>
+            <a:picLocks noChangeAspect="1"/>
+          </p:cNvPicPr>
+          <p:nvPr/>
+        </p:nvPicPr>
+        <p:blipFill>
+          <a:blip r:embed="rId3"/>
+          <a:stretch>
+            <a:fillRect/>
+          </a:stretch>
+        </p:blipFill>
+        <p:spPr>
+          <a:xfrm>
+            <a:off x="6307025" y="1548384"/>
+            <a:ext cx="5261469" cy="4665535"/>
+          </a:xfrm>
+          <a:prstGeom prst="rect">
+            <a:avLst/>
+          </a:prstGeom>
+        </p:spPr>
+      </p:pic>
+      <p:pic>
+        <p:nvPicPr>
+          <p:cNvPr id="6" name="Picture 2" descr="RÃ©sultats de recherche d'images pour Â«Â restful apiÂ Â»">
+            <a:extLst>
+              <a:ext uri="{FF2B5EF4-FFF2-40B4-BE49-F238E27FC236}">
+                <a16:creationId xmlns:a16="http://schemas.microsoft.com/office/drawing/2014/main" id="{9DDA8B27-972C-08B6-442D-2239764CE065}"/>
+              </a:ext>
+            </a:extLst>
+          </p:cNvPr>
+          <p:cNvPicPr>
+            <a:picLocks noChangeAspect="1" noChangeArrowheads="1"/>
+          </p:cNvPicPr>
+          <p:nvPr/>
+        </p:nvPicPr>
+        <p:blipFill>
+          <a:blip r:embed="rId4" cstate="print">
+            <a:extLst>
+              <a:ext uri="{28A0092B-C50C-407E-A947-70E740481C1C}">
+                <a14:useLocalDpi xmlns:a14="http://schemas.microsoft.com/office/drawing/2010/main" val="0"/>
+              </a:ext>
+            </a:extLst>
+          </a:blip>
+          <a:srcRect/>
+          <a:stretch>
+            <a:fillRect/>
+          </a:stretch>
+        </p:blipFill>
+        <p:spPr bwMode="auto">
+          <a:xfrm>
+            <a:off x="278912" y="84877"/>
+            <a:ext cx="2839395" cy="2088232"/>
+          </a:xfrm>
+          <a:prstGeom prst="rect">
+            <a:avLst/>
+          </a:prstGeom>
+          <a:noFill/>
+          <a:extLst>
+            <a:ext uri="{909E8E84-426E-40DD-AFC4-6F175D3DCCD1}">
+              <a14:hiddenFill xmlns:a14="http://schemas.microsoft.com/office/drawing/2010/main">
+                <a:solidFill>
+                  <a:srgbClr val="FFFFFF"/>
+                </a:solidFill>
+              </a14:hiddenFill>
+            </a:ext>
+          </a:extLst>
+        </p:spPr>
+      </p:pic>
+      <p:sp>
+        <p:nvSpPr>
+          <p:cNvPr id="7" name="ZoneTexte 6">
+            <a:extLst>
+              <a:ext uri="{FF2B5EF4-FFF2-40B4-BE49-F238E27FC236}">
+                <a16:creationId xmlns:a16="http://schemas.microsoft.com/office/drawing/2014/main" id="{2C84350A-BD60-F385-1813-47E275553A7A}"/>
+              </a:ext>
+            </a:extLst>
+          </p:cNvPr>
+          <p:cNvSpPr txBox="1"/>
+          <p:nvPr/>
+        </p:nvSpPr>
+        <p:spPr>
+          <a:xfrm>
+            <a:off x="1969008" y="215470"/>
+            <a:ext cx="9938897" cy="646331"/>
+          </a:xfrm>
+          <a:prstGeom prst="rect">
+            <a:avLst/>
+          </a:prstGeom>
+          <a:noFill/>
+        </p:spPr>
+        <p:txBody>
+          <a:bodyPr wrap="square" rtlCol="0">
+            <a:spAutoFit/>
+          </a:bodyPr>
+          <a:lstStyle/>
+          <a:p>
+            <a:pPr algn="r"/>
+            <a:r>
+              <a:rPr lang="fr-CA" sz="3600" b="1" dirty="0">
+                <a:solidFill>
+                  <a:srgbClr val="00B0F0"/>
+                </a:solidFill>
+              </a:rPr>
+              <a:t>Clé par authentification</a:t>
+            </a:r>
+          </a:p>
+        </p:txBody>
+      </p:sp>
+      <p:sp>
+        <p:nvSpPr>
+          <p:cNvPr id="8" name="ZoneTexte 7">
+            <a:extLst>
+              <a:ext uri="{FF2B5EF4-FFF2-40B4-BE49-F238E27FC236}">
+                <a16:creationId xmlns:a16="http://schemas.microsoft.com/office/drawing/2014/main" id="{43BFA7CB-CC85-60CF-9203-62534B779CB2}"/>
+              </a:ext>
+            </a:extLst>
+          </p:cNvPr>
+          <p:cNvSpPr txBox="1"/>
+          <p:nvPr/>
+        </p:nvSpPr>
+        <p:spPr>
+          <a:xfrm>
+            <a:off x="1969008" y="932580"/>
+            <a:ext cx="9938897" cy="369332"/>
+          </a:xfrm>
+          <a:prstGeom prst="rect">
+            <a:avLst/>
+          </a:prstGeom>
+          <a:noFill/>
+        </p:spPr>
+        <p:txBody>
+          <a:bodyPr wrap="square" rtlCol="0">
+            <a:spAutoFit/>
+          </a:bodyPr>
+          <a:lstStyle/>
+          <a:p>
+            <a:pPr algn="r"/>
+            <a:r>
+              <a:rPr lang="fr-CA" b="1" dirty="0">
+                <a:solidFill>
+                  <a:srgbClr val="00B050"/>
+                </a:solidFill>
+              </a:rPr>
+              <a:t>Protocole HTTP pour requête de clé d’accès</a:t>
+            </a:r>
+          </a:p>
+        </p:txBody>
+      </p:sp>
+    </p:spTree>
+    <p:extLst>
+      <p:ext uri="{BB962C8B-B14F-4D97-AF65-F5344CB8AC3E}">
+        <p14:creationId xmlns:p14="http://schemas.microsoft.com/office/powerpoint/2010/main" val="2274674395"/>
+      </p:ext>
+    </p:extLst>
+  </p:cSld>
+  <p:clrMapOvr>
+    <a:masterClrMapping/>
+  </p:clrMapOvr>
+</p:sld>
+</file>
+
+<file path=ppt/slides/slide12.xml><?xml version="1.0" encoding="utf-8"?>
+<p:sld xmlns:a="http://schemas.openxmlformats.org/drawingml/2006/main" xmlns:r="http://schemas.openxmlformats.org/officeDocument/2006/relationships" xmlns:p="http://schemas.openxmlformats.org/presentationml/2006/main">
+  <p:cSld>
+    <p:spTree>
+      <p:nvGrpSpPr>
+        <p:cNvPr id="1" name=""/>
+        <p:cNvGrpSpPr/>
+        <p:nvPr/>
+      </p:nvGrpSpPr>
+      <p:grpSpPr>
+        <a:xfrm>
+          <a:off x="0" y="0"/>
+          <a:ext cx="0" cy="0"/>
+          <a:chOff x="0" y="0"/>
+          <a:chExt cx="0" cy="0"/>
+        </a:xfrm>
+      </p:grpSpPr>
       <p:sp>
         <p:nvSpPr>
           <p:cNvPr id="2" name="Titre 1">

</xml_diff>